<commit_message>
vault backup: 2025-11-01 00:01:13
</commit_message>
<xml_diff>
--- a/projects-temp/2025-11-01-ai-talk/AI-Tourism-Presentation-Simon-Smaluhn.pptx
+++ b/projects-temp/2025-11-01-ai-talk/AI-Tourism-Presentation-Simon-Smaluhn.pptx
@@ -3604,8 +3604,8 @@
         </p:nvSpPr>
         <p:spPr>
           <a:xfrm>
-            <a:off x="6400800" y="731520"/>
-            <a:ext cx="5029200" cy="731520"/>
+            <a:off x="914400" y="731520"/>
+            <a:ext cx="10362895" cy="731520"/>
           </a:xfrm>
           <a:prstGeom prst="rect">
             <a:avLst/>
@@ -3618,15 +3618,15 @@
           </a:bodyPr>
           <a:lstStyle/>
           <a:p>
-            <a:pPr>
-              <a:defRPr sz="4400" b="1">
-                <a:solidFill>
-                  <a:srgbClr val="2563EB"/>
-                </a:solidFill>
-              </a:defRPr>
-            </a:pPr>
-            <a:r>
-              <a:t>FAVORS.ID</a:t>
+            <a:pPr algn="ctr">
+              <a:defRPr sz="4000" b="1">
+                <a:solidFill>
+                  <a:srgbClr val="1F2937"/>
+                </a:solidFill>
+              </a:defRPr>
+            </a:pPr>
+            <a:r>
+              <a:t>REAL EXAMPLE: EVENT TICKETING</a:t>
             </a:r>
           </a:p>
         </p:txBody>
@@ -3639,8 +3639,8 @@
         </p:nvSpPr>
         <p:spPr>
           <a:xfrm>
-            <a:off x="6400800" y="1371600"/>
-            <a:ext cx="5029200" cy="457200"/>
+            <a:off x="1371600" y="2011680"/>
+            <a:ext cx="4572000" cy="3200400"/>
           </a:xfrm>
           <a:prstGeom prst="rect">
             <a:avLst/>
@@ -3654,14 +3654,132 @@
           <a:lstStyle/>
           <a:p>
             <a:pPr>
-              <a:defRPr sz="2000">
-                <a:solidFill>
-                  <a:srgbClr val="1F2937"/>
-                </a:solidFill>
-              </a:defRPr>
-            </a:pPr>
-            <a:r>
-              <a:t>Event Ticketing &amp; Crowdsourcing</a:t>
+              <a:defRPr sz="2200" b="1">
+                <a:solidFill>
+                  <a:srgbClr val="1F2937"/>
+                </a:solidFill>
+              </a:defRPr>
+            </a:pPr>
+            <a:r>
+              <a:t>THE PROBLEM:</a:t>
+            </a:r>
+          </a:p>
+          <a:p/>
+          <a:p>
+            <a:pPr>
+              <a:defRPr sz="1600">
+                <a:solidFill>
+                  <a:srgbClr val="1F2937"/>
+                </a:solidFill>
+              </a:defRPr>
+            </a:pPr>
+            <a:r>
+              <a:t>🎫 Tourism villages need to:</a:t>
+            </a:r>
+          </a:p>
+          <a:p>
+            <a:pPr>
+              <a:defRPr sz="1600">
+                <a:solidFill>
+                  <a:srgbClr val="1F2937"/>
+                </a:solidFill>
+              </a:defRPr>
+            </a:pPr>
+            <a:r>
+              <a:t>• Sell tour tickets</a:t>
+            </a:r>
+          </a:p>
+          <a:p>
+            <a:pPr>
+              <a:defRPr sz="1600">
+                <a:solidFill>
+                  <a:srgbClr val="1F2937"/>
+                </a:solidFill>
+              </a:defRPr>
+            </a:pPr>
+            <a:r>
+              <a:t>• Manage bookings</a:t>
+            </a:r>
+          </a:p>
+          <a:p>
+            <a:pPr>
+              <a:defRPr sz="1600">
+                <a:solidFill>
+                  <a:srgbClr val="1F2937"/>
+                </a:solidFill>
+              </a:defRPr>
+            </a:pPr>
+            <a:r>
+              <a:t>• Track visitor data</a:t>
+            </a:r>
+          </a:p>
+          <a:p>
+            <a:pPr>
+              <a:defRPr sz="1600">
+                <a:solidFill>
+                  <a:srgbClr val="1F2937"/>
+                </a:solidFill>
+              </a:defRPr>
+            </a:pPr>
+            <a:r>
+              <a:t>• Build community</a:t>
+            </a:r>
+          </a:p>
+          <a:p>
+            <a:pPr>
+              <a:defRPr sz="1600">
+                <a:solidFill>
+                  <a:srgbClr val="1F2937"/>
+                </a:solidFill>
+              </a:defRPr>
+            </a:pPr>
+          </a:p>
+          <a:p>
+            <a:pPr>
+              <a:defRPr sz="1600">
+                <a:solidFill>
+                  <a:srgbClr val="1F2937"/>
+                </a:solidFill>
+              </a:defRPr>
+            </a:pPr>
+            <a:r>
+              <a:t>But most systems are:</a:t>
+            </a:r>
+          </a:p>
+          <a:p>
+            <a:pPr>
+              <a:defRPr sz="1600">
+                <a:solidFill>
+                  <a:srgbClr val="1F2937"/>
+                </a:solidFill>
+              </a:defRPr>
+            </a:pPr>
+            <a:r>
+              <a:t>❌ Too complex</a:t>
+            </a:r>
+          </a:p>
+          <a:p>
+            <a:pPr>
+              <a:defRPr sz="1600">
+                <a:solidFill>
+                  <a:srgbClr val="1F2937"/>
+                </a:solidFill>
+              </a:defRPr>
+            </a:pPr>
+            <a:r>
+              <a:t>❌ Too expensive</a:t>
+            </a:r>
+          </a:p>
+          <a:p>
+            <a:pPr>
+              <a:defRPr sz="1600">
+                <a:solidFill>
+                  <a:srgbClr val="1F2937"/>
+                </a:solidFill>
+              </a:defRPr>
+            </a:pPr>
+            <a:r>
+              <a:t>❌ Built for big venues</a:t>
             </a:r>
           </a:p>
         </p:txBody>
@@ -3674,8 +3792,8 @@
         </p:nvSpPr>
         <p:spPr>
           <a:xfrm>
-            <a:off x="6400800" y="2103120"/>
-            <a:ext cx="5029200" cy="1828800"/>
+            <a:off x="6400800" y="2011680"/>
+            <a:ext cx="4572000" cy="3200400"/>
           </a:xfrm>
           <a:prstGeom prst="rect">
             <a:avLst/>
@@ -3689,14 +3807,88 @@
           <a:lstStyle/>
           <a:p>
             <a:pPr>
+              <a:defRPr sz="2200" b="1">
+                <a:solidFill>
+                  <a:srgbClr val="1F2937"/>
+                </a:solidFill>
+              </a:defRPr>
+            </a:pPr>
+            <a:r>
+              <a:t>WHAT WE BUILT:</a:t>
+            </a:r>
+          </a:p>
+          <a:p/>
+          <a:p>
+            <a:pPr>
+              <a:defRPr sz="1600">
+                <a:solidFill>
+                  <a:srgbClr val="2563EB"/>
+                </a:solidFill>
+              </a:defRPr>
+            </a:pPr>
+            <a:r>
+              <a:t>Favors.id solves this:</a:t>
+            </a:r>
+          </a:p>
+          <a:p>
+            <a:pPr>
+              <a:defRPr sz="1600">
+                <a:solidFill>
+                  <a:srgbClr val="1F2937"/>
+                </a:solidFill>
+              </a:defRPr>
+            </a:pPr>
+            <a:r>
+              <a:t>✅ Simple ticketing</a:t>
+            </a:r>
+          </a:p>
+          <a:p>
+            <a:pPr>
+              <a:defRPr sz="1600">
+                <a:solidFill>
+                  <a:srgbClr val="1F2937"/>
+                </a:solidFill>
+              </a:defRPr>
+            </a:pPr>
+            <a:r>
+              <a:t>✅ Free to start</a:t>
+            </a:r>
+          </a:p>
+          <a:p>
+            <a:pPr>
+              <a:defRPr sz="1600">
+                <a:solidFill>
+                  <a:srgbClr val="1F2937"/>
+                </a:solidFill>
+              </a:defRPr>
+            </a:pPr>
+            <a:r>
+              <a:t>✅ Track bookings</a:t>
+            </a:r>
+          </a:p>
+          <a:p>
+            <a:pPr>
+              <a:defRPr sz="1600">
+                <a:solidFill>
+                  <a:srgbClr val="1F2937"/>
+                </a:solidFill>
+              </a:defRPr>
+            </a:pPr>
+            <a:r>
+              <a:t>✅ Community features</a:t>
+            </a:r>
+          </a:p>
+          <a:p/>
+          <a:p>
+            <a:pPr>
               <a:defRPr sz="1600" b="1">
                 <a:solidFill>
-                  <a:srgbClr val="1F2937"/>
-                </a:solidFill>
-              </a:defRPr>
-            </a:pPr>
-            <a:r>
-              <a:t>THE CHALLENGE:</a:t>
+                  <a:srgbClr val="2563EB"/>
+                </a:solidFill>
+              </a:defRPr>
+            </a:pPr>
+            <a:r>
+              <a:t>Learning:</a:t>
             </a:r>
           </a:p>
           <a:p>
@@ -3708,7 +3900,7 @@
               </a:defRPr>
             </a:pPr>
             <a:r>
-              <a:t>🎫 Villages need event ticketing</a:t>
+              <a:t>Start with REAL pain point</a:t>
             </a:r>
           </a:p>
           <a:p>
@@ -3720,7 +3912,7 @@
               </a:defRPr>
             </a:pPr>
             <a:r>
-              <a:t>📱 Systems too complex</a:t>
+              <a:t>Build simplest solution</a:t>
             </a:r>
           </a:p>
           <a:p>
@@ -3732,97 +3924,14 @@
               </a:defRPr>
             </a:pPr>
             <a:r>
-              <a:t>💰 High fees</a:t>
-            </a:r>
-          </a:p>
-        </p:txBody>
-      </p:sp>
-      <p:sp>
-        <p:nvSpPr>
-          <p:cNvPr id="5" name="TextBox 4"/>
-          <p:cNvSpPr txBox="1"/>
-          <p:nvPr/>
-        </p:nvSpPr>
-        <p:spPr>
-          <a:xfrm>
-            <a:off x="6400800" y="3931920"/>
-            <a:ext cx="5029200" cy="1828800"/>
-          </a:xfrm>
-          <a:prstGeom prst="rect">
-            <a:avLst/>
-          </a:prstGeom>
-          <a:noFill/>
-        </p:spPr>
-        <p:txBody>
-          <a:bodyPr wrap="none">
-            <a:spAutoFit/>
-          </a:bodyPr>
-          <a:lstStyle/>
-          <a:p>
-            <a:pPr>
-              <a:defRPr sz="1600" b="1">
-                <a:solidFill>
-                  <a:srgbClr val="1F2937"/>
-                </a:solidFill>
-              </a:defRPr>
-            </a:pPr>
-            <a:r>
-              <a:t>THE SOLUTION:</a:t>
-            </a:r>
-          </a:p>
-          <a:p>
-            <a:pPr>
-              <a:defRPr sz="1400">
-                <a:solidFill>
-                  <a:srgbClr val="1F2937"/>
-                </a:solidFill>
-              </a:defRPr>
-            </a:pPr>
-            <a:r>
-              <a:t>✅ Simple event creation</a:t>
-            </a:r>
-          </a:p>
-          <a:p>
-            <a:pPr>
-              <a:defRPr sz="1400">
-                <a:solidFill>
-                  <a:srgbClr val="1F2937"/>
-                </a:solidFill>
-              </a:defRPr>
-            </a:pPr>
-            <a:r>
-              <a:t>✅ Free &amp; paid ticketing</a:t>
-            </a:r>
-          </a:p>
-          <a:p>
-            <a:pPr>
-              <a:defRPr sz="1400">
-                <a:solidFill>
-                  <a:srgbClr val="1F2937"/>
-                </a:solidFill>
-              </a:defRPr>
-            </a:pPr>
-            <a:r>
-              <a:t>✅ Built-in crowdfunding</a:t>
-            </a:r>
-          </a:p>
-          <a:p>
-            <a:pPr>
-              <a:defRPr sz="1400">
-                <a:solidFill>
-                  <a:srgbClr val="1F2937"/>
-                </a:solidFill>
-              </a:defRPr>
-            </a:pPr>
-            <a:r>
-              <a:t>✅ Community discovery</a:t>
-            </a:r>
-          </a:p>
-        </p:txBody>
-      </p:sp>
-      <p:sp>
-        <p:nvSpPr>
-          <p:cNvPr id="6" name="Rectangle 5"/>
+              <a:t>Test with actual users</a:t>
+            </a:r>
+          </a:p>
+        </p:txBody>
+      </p:sp>
+      <p:sp>
+        <p:nvSpPr>
+          <p:cNvPr id="5" name="Rectangle 4"/>
           <p:cNvSpPr/>
           <p:nvPr/>
         </p:nvSpPr>
@@ -3867,7 +3976,7 @@
       </p:sp>
       <p:sp>
         <p:nvSpPr>
-          <p:cNvPr id="7" name="TextBox 6"/>
+          <p:cNvPr id="6" name="TextBox 5"/>
           <p:cNvSpPr txBox="1"/>
           <p:nvPr/>
         </p:nvSpPr>
@@ -3895,7 +4004,7 @@
               </a:defRPr>
             </a:pPr>
             <a:r>
-              <a:t>FOR PINGE VILLAGE: Create tours as events → Sell tickets → Track bookings</a:t>
+              <a:t>PRINCIPLE: Build for the specific pain point, not a generic solution</a:t>
             </a:r>
           </a:p>
         </p:txBody>

</xml_diff>